<commit_message>
Added updated proposal kickoff talk and proposal.
</commit_message>
<xml_diff>
--- a/Writing/Proposal/Automatic Ranking of Classification Algorithms.pptx
+++ b/Writing/Proposal/Automatic Ranking of Classification Algorithms.pptx
@@ -7,13 +7,10 @@
   <p:sldIdLst>
     <p:sldId id="256" r:id="rId2"/>
     <p:sldId id="262" r:id="rId3"/>
-    <p:sldId id="264" r:id="rId4"/>
-    <p:sldId id="260" r:id="rId5"/>
-    <p:sldId id="257" r:id="rId6"/>
-    <p:sldId id="261" r:id="rId7"/>
-    <p:sldId id="263" r:id="rId8"/>
-    <p:sldId id="259" r:id="rId9"/>
-    <p:sldId id="258" r:id="rId10"/>
+    <p:sldId id="260" r:id="rId4"/>
+    <p:sldId id="257" r:id="rId5"/>
+    <p:sldId id="261" r:id="rId6"/>
+    <p:sldId id="263" r:id="rId7"/>
   </p:sldIdLst>
   <p:sldSz cx="12192000" cy="6858000"/>
   <p:notesSz cx="6858000" cy="9144000"/>
@@ -112,7 +109,16 @@
       </a:defRPr>
     </a:lvl9pPr>
   </p:defaultTextStyle>
+  <p:extLst>
+    <p:ext uri="{EFAFB233-063F-42B5-8137-9DF3F51BA10A}">
+      <p15:sldGuideLst xmlns:p15="http://schemas.microsoft.com/office/powerpoint/2012/main"/>
+    </p:ext>
+  </p:extLst>
 </p:presentation>
+</file>
+
+<file path=ppt/revisionInfo.xml><?xml version="1.0" encoding="utf-8"?>
+<p1510:revInfo xmlns:a="http://schemas.openxmlformats.org/drawingml/2006/main" xmlns:r="http://schemas.openxmlformats.org/officeDocument/2006/relationships" xmlns:p1510="http://schemas.microsoft.com/office/powerpoint/2015/10/main"/>
 </file>
 
 <file path=ppt/slideLayouts/slideLayout1.xml><?xml version="1.0" encoding="utf-8"?>
@@ -3404,23 +3410,31 @@
           <a:p>
             <a:r>
               <a:rPr lang="de-DE" dirty="0"/>
-              <a:t>(</a:t>
-            </a:r>
-            <a:r>
-              <a:rPr lang="de-DE" dirty="0" err="1"/>
-              <a:t>Using</a:t>
-            </a:r>
-            <a:r>
-              <a:rPr lang="de-DE" dirty="0"/>
-              <a:t> Meta-Learning on Performance </a:t>
-            </a:r>
-            <a:r>
-              <a:rPr lang="de-DE" dirty="0" err="1"/>
-              <a:t>Measures</a:t>
-            </a:r>
-            <a:r>
-              <a:rPr lang="de-DE" dirty="0"/>
-              <a:t>)</a:t>
+              <a:t>A </a:t>
+            </a:r>
+            <a:r>
+              <a:rPr lang="de-DE" dirty="0" err="1"/>
+              <a:t>Comparison</a:t>
+            </a:r>
+            <a:r>
+              <a:rPr lang="de-DE" dirty="0"/>
+              <a:t> </a:t>
+            </a:r>
+            <a:r>
+              <a:rPr lang="de-DE" dirty="0" err="1"/>
+              <a:t>of</a:t>
+            </a:r>
+            <a:r>
+              <a:rPr lang="de-DE" dirty="0"/>
+              <a:t> Regression-</a:t>
+            </a:r>
+            <a:r>
+              <a:rPr lang="de-DE" dirty="0" err="1"/>
+              <a:t>Based</a:t>
+            </a:r>
+            <a:r>
+              <a:rPr lang="de-DE" dirty="0"/>
+              <a:t> Ranking and Preference Models</a:t>
             </a:r>
           </a:p>
           <a:p>
@@ -3428,21 +3442,17 @@
           </a:p>
           <a:p>
             <a:r>
-              <a:rPr lang="de-DE" dirty="0"/>
-              <a:t>Bachelor Thesis </a:t>
+              <a:rPr lang="de-DE" dirty="0" err="1"/>
+              <a:t>Bachelor‘s</a:t>
+            </a:r>
+            <a:r>
+              <a:rPr lang="de-DE" dirty="0"/>
+              <a:t> Thesis </a:t>
             </a:r>
             <a:r>
               <a:rPr lang="de-DE" dirty="0" err="1"/>
               <a:t>Proposal</a:t>
             </a:r>
-            <a:r>
-              <a:rPr lang="de-DE" dirty="0"/>
-              <a:t>: </a:t>
-            </a:r>
-            <a:r>
-              <a:rPr lang="de-DE" dirty="0" err="1"/>
-              <a:t>Presentation</a:t>
-            </a:r>
             <a:br>
               <a:rPr lang="de-DE" dirty="0"/>
             </a:br>
@@ -3459,22 +3469,12 @@
             </a:br>
             <a:r>
               <a:rPr lang="de-DE" dirty="0"/>
-              <a:t>Prof. Eyke Hüllermeier</a:t>
+              <a:t>Prof. Dr. Eyke Hüllermeier</a:t>
             </a:r>
             <a:br>
               <a:rPr lang="de-DE" dirty="0"/>
             </a:br>
-            <a:r>
-              <a:rPr lang="de-DE" dirty="0"/>
-              <a:t>Felix Mohr</a:t>
-            </a:r>
-            <a:br>
-              <a:rPr lang="de-DE" dirty="0"/>
-            </a:br>
-            <a:r>
-              <a:rPr lang="de-DE" dirty="0"/>
-              <a:t>Marcel Wever</a:t>
-            </a:r>
+            <a:endParaRPr lang="de-DE" dirty="0"/>
           </a:p>
         </p:txBody>
       </p:sp>
@@ -3625,7 +3625,34 @@
               <a:rPr lang="de-DE" dirty="0" err="1"/>
               <a:t>process</a:t>
             </a:r>
-            <a:endParaRPr lang="de-DE" dirty="0"/>
+            <a:r>
+              <a:rPr lang="de-DE" dirty="0"/>
+              <a:t> (</a:t>
+            </a:r>
+            <a:r>
+              <a:rPr lang="de-DE" dirty="0" err="1"/>
+              <a:t>as</a:t>
+            </a:r>
+            <a:r>
+              <a:rPr lang="de-DE" dirty="0"/>
+              <a:t> </a:t>
+            </a:r>
+            <a:r>
+              <a:rPr lang="de-DE" dirty="0" err="1"/>
+              <a:t>part</a:t>
+            </a:r>
+            <a:r>
+              <a:rPr lang="de-DE" dirty="0"/>
+              <a:t> </a:t>
+            </a:r>
+            <a:r>
+              <a:rPr lang="de-DE" dirty="0" err="1"/>
+              <a:t>of</a:t>
+            </a:r>
+            <a:r>
+              <a:rPr lang="de-DE" dirty="0"/>
+              <a:t> ml-pipeline)</a:t>
+            </a:r>
           </a:p>
           <a:p>
             <a:pPr lvl="1"/>
@@ -3832,7 +3859,7 @@
           <p:cNvPr id="2" name="Titel 1">
             <a:extLst>
               <a:ext uri="{FF2B5EF4-FFF2-40B4-BE49-F238E27FC236}">
-                <a16:creationId xmlns:a16="http://schemas.microsoft.com/office/drawing/2014/main" id="{93CBA983-DCB1-478F-8514-07E85C80431C}"/>
+                <a16:creationId xmlns:a16="http://schemas.microsoft.com/office/drawing/2014/main" id="{0D5CDDA6-6B6C-4421-A512-2C9ADC34A9D9}"/>
               </a:ext>
             </a:extLst>
           </p:cNvPr>
@@ -3849,12 +3876,8 @@
           <a:lstStyle/>
           <a:p>
             <a:r>
-              <a:rPr lang="de-DE" dirty="0" err="1"/>
-              <a:t>Related</a:t>
-            </a:r>
-            <a:r>
-              <a:rPr lang="de-DE" dirty="0"/>
-              <a:t> Work</a:t>
+              <a:rPr lang="de-DE" dirty="0"/>
+              <a:t>Approach</a:t>
             </a:r>
           </a:p>
         </p:txBody>
@@ -3864,7 +3887,7 @@
           <p:cNvPr id="3" name="Inhaltsplatzhalter 2">
             <a:extLst>
               <a:ext uri="{FF2B5EF4-FFF2-40B4-BE49-F238E27FC236}">
-                <a16:creationId xmlns:a16="http://schemas.microsoft.com/office/drawing/2014/main" id="{C56743B7-C969-4C5A-970A-393E1735DBF5}"/>
+                <a16:creationId xmlns:a16="http://schemas.microsoft.com/office/drawing/2014/main" id="{E3041BC5-FA03-4B87-B554-B1722DBB22E6}"/>
               </a:ext>
             </a:extLst>
           </p:cNvPr>
@@ -3881,52 +3904,60 @@
           <a:lstStyle/>
           <a:p>
             <a:r>
-              <a:rPr lang="de-DE" dirty="0" err="1"/>
-              <a:t>Succesful</a:t>
-            </a:r>
-            <a:r>
-              <a:rPr lang="de-DE" dirty="0"/>
-              <a:t> *</a:t>
-            </a:r>
-            <a:r>
-              <a:rPr lang="de-DE" dirty="0" err="1"/>
-              <a:t>example</a:t>
-            </a:r>
-            <a:r>
-              <a:rPr lang="de-DE" dirty="0"/>
-              <a:t>*</a:t>
-            </a:r>
-          </a:p>
-          <a:p>
-            <a:r>
-              <a:rPr lang="de-DE" dirty="0" err="1"/>
-              <a:t>Failed</a:t>
-            </a:r>
-            <a:r>
-              <a:rPr lang="de-DE" dirty="0"/>
-              <a:t> *</a:t>
-            </a:r>
-            <a:r>
-              <a:rPr lang="de-DE" dirty="0" err="1"/>
-              <a:t>example</a:t>
-            </a:r>
-            <a:r>
-              <a:rPr lang="de-DE" dirty="0"/>
-              <a:t>*</a:t>
-            </a:r>
-          </a:p>
-          <a:p>
-            <a:r>
-              <a:rPr lang="de-DE" dirty="0" err="1"/>
-              <a:t>Withing</a:t>
-            </a:r>
-            <a:r>
-              <a:rPr lang="de-DE" dirty="0"/>
-              <a:t> </a:t>
-            </a:r>
-            <a:r>
-              <a:rPr lang="de-DE" dirty="0" err="1"/>
-              <a:t>context</a:t>
+              <a:rPr lang="de-DE" dirty="0"/>
+              <a:t>Test </a:t>
+            </a:r>
+            <a:r>
+              <a:rPr lang="de-DE" dirty="0" err="1"/>
+              <a:t>wheter</a:t>
+            </a:r>
+            <a:r>
+              <a:rPr lang="de-DE" dirty="0"/>
+              <a:t> </a:t>
+            </a:r>
+            <a:r>
+              <a:rPr lang="de-DE" dirty="0" err="1"/>
+              <a:t>it</a:t>
+            </a:r>
+            <a:r>
+              <a:rPr lang="de-DE" dirty="0"/>
+              <a:t> </a:t>
+            </a:r>
+            <a:r>
+              <a:rPr lang="de-DE" dirty="0" err="1"/>
+              <a:t>is</a:t>
+            </a:r>
+            <a:r>
+              <a:rPr lang="de-DE" dirty="0"/>
+              <a:t> </a:t>
+            </a:r>
+            <a:r>
+              <a:rPr lang="de-DE" dirty="0" err="1"/>
+              <a:t>possible</a:t>
+            </a:r>
+            <a:r>
+              <a:rPr lang="de-DE" dirty="0"/>
+              <a:t> </a:t>
+            </a:r>
+            <a:r>
+              <a:rPr lang="de-DE" dirty="0" err="1"/>
+              <a:t>to</a:t>
+            </a:r>
+            <a:r>
+              <a:rPr lang="de-DE" dirty="0"/>
+              <a:t> </a:t>
+            </a:r>
+            <a:r>
+              <a:rPr lang="de-DE" dirty="0" err="1"/>
+              <a:t>predict</a:t>
+            </a:r>
+            <a:r>
+              <a:rPr lang="de-DE" dirty="0"/>
+              <a:t> </a:t>
+            </a:r>
+            <a:r>
+              <a:rPr lang="de-DE" dirty="0" err="1"/>
+              <a:t>performance</a:t>
             </a:r>
             <a:r>
               <a:rPr lang="de-DE" dirty="0"/>
@@ -3938,12 +3969,355 @@
             </a:r>
             <a:r>
               <a:rPr lang="de-DE" dirty="0"/>
-              <a:t> Meta-</a:t>
-            </a:r>
-            <a:r>
-              <a:rPr lang="de-DE" dirty="0" err="1"/>
-              <a:t>learning</a:t>
-            </a:r>
+              <a:t> </a:t>
+            </a:r>
+            <a:r>
+              <a:rPr lang="de-DE" dirty="0" err="1"/>
+              <a:t>classifiers</a:t>
+            </a:r>
+            <a:r>
+              <a:rPr lang="de-DE" dirty="0"/>
+              <a:t> </a:t>
+            </a:r>
+            <a:r>
+              <a:rPr lang="de-DE" dirty="0" err="1"/>
+              <a:t>well</a:t>
+            </a:r>
+            <a:r>
+              <a:rPr lang="de-DE" dirty="0"/>
+              <a:t> </a:t>
+            </a:r>
+            <a:r>
+              <a:rPr lang="de-DE" dirty="0" err="1"/>
+              <a:t>enough</a:t>
+            </a:r>
+            <a:r>
+              <a:rPr lang="de-DE" dirty="0"/>
+              <a:t> on </a:t>
+            </a:r>
+            <a:r>
+              <a:rPr lang="de-DE" dirty="0" err="1"/>
+              <a:t>basis</a:t>
+            </a:r>
+            <a:r>
+              <a:rPr lang="de-DE" dirty="0"/>
+              <a:t> </a:t>
+            </a:r>
+            <a:r>
+              <a:rPr lang="de-DE" dirty="0" err="1"/>
+              <a:t>of</a:t>
+            </a:r>
+            <a:r>
+              <a:rPr lang="de-DE" dirty="0"/>
+              <a:t> </a:t>
+            </a:r>
+            <a:r>
+              <a:rPr lang="de-DE" dirty="0" err="1"/>
+              <a:t>metadata</a:t>
+            </a:r>
+            <a:r>
+              <a:rPr lang="de-DE" dirty="0"/>
+              <a:t> (</a:t>
+            </a:r>
+            <a:r>
+              <a:rPr lang="de-DE" dirty="0" err="1"/>
+              <a:t>abstraction</a:t>
+            </a:r>
+            <a:r>
+              <a:rPr lang="de-DE" dirty="0"/>
+              <a:t> </a:t>
+            </a:r>
+            <a:r>
+              <a:rPr lang="de-DE" dirty="0" err="1"/>
+              <a:t>question</a:t>
+            </a:r>
+            <a:r>
+              <a:rPr lang="de-DE" dirty="0"/>
+              <a:t>)</a:t>
+            </a:r>
+          </a:p>
+          <a:p>
+            <a:r>
+              <a:rPr lang="de-DE" dirty="0"/>
+              <a:t>Implementation </a:t>
+            </a:r>
+            <a:r>
+              <a:rPr lang="de-DE" dirty="0" err="1"/>
+              <a:t>is</a:t>
+            </a:r>
+            <a:r>
+              <a:rPr lang="de-DE" dirty="0"/>
+              <a:t> </a:t>
+            </a:r>
+            <a:r>
+              <a:rPr lang="de-DE" dirty="0" err="1"/>
+              <a:t>supposed</a:t>
+            </a:r>
+            <a:r>
+              <a:rPr lang="de-DE" dirty="0"/>
+              <a:t> </a:t>
+            </a:r>
+            <a:r>
+              <a:rPr lang="de-DE" dirty="0" err="1"/>
+              <a:t>to</a:t>
+            </a:r>
+            <a:r>
+              <a:rPr lang="de-DE" dirty="0"/>
+              <a:t> </a:t>
+            </a:r>
+            <a:r>
+              <a:rPr lang="de-DE" dirty="0" err="1"/>
+              <a:t>be</a:t>
+            </a:r>
+            <a:r>
+              <a:rPr lang="de-DE" dirty="0"/>
+              <a:t> </a:t>
+            </a:r>
+            <a:r>
+              <a:rPr lang="de-DE" dirty="0" err="1"/>
+              <a:t>integrated</a:t>
+            </a:r>
+            <a:r>
+              <a:rPr lang="de-DE" dirty="0"/>
+              <a:t> in </a:t>
+            </a:r>
+            <a:r>
+              <a:rPr lang="de-DE" dirty="0" err="1"/>
+              <a:t>solutions</a:t>
+            </a:r>
+            <a:r>
+              <a:rPr lang="de-DE" dirty="0"/>
+              <a:t>: Assist in </a:t>
+            </a:r>
+            <a:r>
+              <a:rPr lang="de-DE" dirty="0" err="1"/>
+              <a:t>pre-selecting</a:t>
+            </a:r>
+            <a:r>
+              <a:rPr lang="de-DE" dirty="0"/>
+              <a:t> </a:t>
+            </a:r>
+            <a:r>
+              <a:rPr lang="de-DE" dirty="0" err="1"/>
+              <a:t>good</a:t>
+            </a:r>
+            <a:r>
+              <a:rPr lang="de-DE" dirty="0"/>
+              <a:t> </a:t>
+            </a:r>
+            <a:r>
+              <a:rPr lang="de-DE" dirty="0" err="1"/>
+              <a:t>algorithms</a:t>
+            </a:r>
+            <a:r>
+              <a:rPr lang="de-DE" dirty="0"/>
+              <a:t> </a:t>
+            </a:r>
+            <a:r>
+              <a:rPr lang="de-DE" dirty="0" err="1"/>
+              <a:t>under</a:t>
+            </a:r>
+            <a:r>
+              <a:rPr lang="de-DE" dirty="0"/>
+              <a:t> </a:t>
+            </a:r>
+            <a:r>
+              <a:rPr lang="de-DE" dirty="0" err="1"/>
+              <a:t>tight</a:t>
+            </a:r>
+            <a:r>
+              <a:rPr lang="de-DE" dirty="0"/>
+              <a:t> time-</a:t>
+            </a:r>
+            <a:r>
+              <a:rPr lang="de-DE" dirty="0" err="1"/>
+              <a:t>constraints</a:t>
+            </a:r>
+            <a:endParaRPr lang="de-DE" dirty="0"/>
+          </a:p>
+          <a:p>
+            <a:r>
+              <a:rPr lang="de-DE" dirty="0"/>
+              <a:t>Dataset </a:t>
+            </a:r>
+            <a:r>
+              <a:rPr lang="de-DE" dirty="0" err="1"/>
+              <a:t>as</a:t>
+            </a:r>
+            <a:r>
+              <a:rPr lang="de-DE" dirty="0"/>
+              <a:t> </a:t>
+            </a:r>
+            <a:r>
+              <a:rPr lang="de-DE" dirty="0" err="1"/>
+              <a:t>input</a:t>
+            </a:r>
+            <a:r>
+              <a:rPr lang="de-DE" dirty="0"/>
+              <a:t>, </a:t>
+            </a:r>
+            <a:r>
+              <a:rPr lang="de-DE" dirty="0" err="1"/>
+              <a:t>ranking</a:t>
+            </a:r>
+            <a:r>
+              <a:rPr lang="de-DE" dirty="0"/>
+              <a:t> </a:t>
+            </a:r>
+            <a:r>
+              <a:rPr lang="de-DE" dirty="0" err="1"/>
+              <a:t>of</a:t>
+            </a:r>
+            <a:r>
+              <a:rPr lang="de-DE" dirty="0"/>
+              <a:t> </a:t>
+            </a:r>
+            <a:r>
+              <a:rPr lang="de-DE" dirty="0" err="1"/>
+              <a:t>classifiers</a:t>
+            </a:r>
+            <a:r>
+              <a:rPr lang="de-DE" dirty="0"/>
+              <a:t> </a:t>
+            </a:r>
+            <a:r>
+              <a:rPr lang="de-DE" dirty="0" err="1"/>
+              <a:t>as</a:t>
+            </a:r>
+            <a:r>
+              <a:rPr lang="de-DE" dirty="0"/>
+              <a:t> </a:t>
+            </a:r>
+            <a:r>
+              <a:rPr lang="de-DE" dirty="0" err="1"/>
+              <a:t>output</a:t>
+            </a:r>
+            <a:endParaRPr lang="de-DE" dirty="0"/>
+          </a:p>
+          <a:p>
+            <a:r>
+              <a:rPr lang="de-DE" dirty="0"/>
+              <a:t>Method List&lt;</a:t>
+            </a:r>
+            <a:r>
+              <a:rPr lang="de-DE" dirty="0" err="1"/>
+              <a:t>Classifier</a:t>
+            </a:r>
+            <a:r>
+              <a:rPr lang="de-DE" dirty="0"/>
+              <a:t>&gt; </a:t>
+            </a:r>
+            <a:r>
+              <a:rPr lang="de-DE" dirty="0" err="1"/>
+              <a:t>getRanking</a:t>
+            </a:r>
+            <a:r>
+              <a:rPr lang="de-DE" dirty="0"/>
+              <a:t>(</a:t>
+            </a:r>
+            <a:r>
+              <a:rPr lang="de-DE" dirty="0" err="1"/>
+              <a:t>Instances</a:t>
+            </a:r>
+            <a:r>
+              <a:rPr lang="de-DE" dirty="0"/>
+              <a:t> y, Labels y) {] (</a:t>
+            </a:r>
+            <a:r>
+              <a:rPr lang="de-DE" dirty="0" err="1"/>
+              <a:t>eig</a:t>
+            </a:r>
+            <a:r>
+              <a:rPr lang="de-DE" dirty="0"/>
+              <a:t> ja nicht -&gt; </a:t>
+            </a:r>
+            <a:r>
+              <a:rPr lang="de-DE" dirty="0" err="1"/>
+              <a:t>letzes</a:t>
+            </a:r>
+            <a:r>
+              <a:rPr lang="de-DE" dirty="0"/>
+              <a:t> Attribut implizit Klasse?)</a:t>
+            </a:r>
+          </a:p>
+          <a:p>
+            <a:r>
+              <a:rPr lang="de-DE" dirty="0" err="1"/>
+              <a:t>Internally</a:t>
+            </a:r>
+            <a:r>
+              <a:rPr lang="de-DE" dirty="0"/>
+              <a:t> </a:t>
+            </a:r>
+            <a:r>
+              <a:rPr lang="de-DE" dirty="0" err="1"/>
+              <a:t>either</a:t>
+            </a:r>
+            <a:r>
+              <a:rPr lang="de-DE" dirty="0"/>
+              <a:t> </a:t>
+            </a:r>
+            <a:r>
+              <a:rPr lang="de-DE" dirty="0" err="1"/>
+              <a:t>regression</a:t>
+            </a:r>
+            <a:r>
+              <a:rPr lang="de-DE" dirty="0"/>
+              <a:t> / </a:t>
+            </a:r>
+            <a:r>
+              <a:rPr lang="de-DE" dirty="0" err="1"/>
+              <a:t>ranking</a:t>
+            </a:r>
+            <a:r>
+              <a:rPr lang="de-DE" dirty="0"/>
+              <a:t> </a:t>
+            </a:r>
+            <a:r>
+              <a:rPr lang="de-DE" dirty="0" err="1"/>
+              <a:t>algorithm</a:t>
+            </a:r>
+            <a:r>
+              <a:rPr lang="de-DE" dirty="0"/>
+              <a:t> </a:t>
+            </a:r>
+            <a:r>
+              <a:rPr lang="de-DE" dirty="0" err="1"/>
+              <a:t>used</a:t>
+            </a:r>
+            <a:r>
+              <a:rPr lang="de-DE" dirty="0"/>
+              <a:t>, </a:t>
+            </a:r>
+            <a:r>
+              <a:rPr lang="de-DE" dirty="0" err="1"/>
+              <a:t>choose</a:t>
+            </a:r>
+            <a:r>
+              <a:rPr lang="de-DE" dirty="0"/>
+              <a:t> </a:t>
+            </a:r>
+            <a:r>
+              <a:rPr lang="de-DE" dirty="0" err="1"/>
+              <a:t>with</a:t>
+            </a:r>
+            <a:r>
+              <a:rPr lang="de-DE" dirty="0"/>
+              <a:t> </a:t>
+            </a:r>
+            <a:r>
+              <a:rPr lang="de-DE" dirty="0" err="1"/>
+              <a:t>flag</a:t>
+            </a:r>
+            <a:endParaRPr lang="de-DE" dirty="0"/>
+          </a:p>
+          <a:p>
+            <a:endParaRPr lang="de-DE" dirty="0"/>
+          </a:p>
+          <a:p>
+            <a:pPr marL="0" indent="0">
+              <a:buNone/>
+            </a:pPr>
             <a:endParaRPr lang="de-DE" dirty="0"/>
           </a:p>
         </p:txBody>
@@ -3951,7 +4325,7 @@
     </p:spTree>
     <p:extLst>
       <p:ext uri="{BB962C8B-B14F-4D97-AF65-F5344CB8AC3E}">
-        <p14:creationId xmlns:p14="http://schemas.microsoft.com/office/powerpoint/2010/main" val="2873535720"/>
+        <p14:creationId xmlns:p14="http://schemas.microsoft.com/office/powerpoint/2010/main" val="2338843410"/>
       </p:ext>
     </p:extLst>
   </p:cSld>
@@ -3980,504 +4354,6 @@
       </p:grpSpPr>
       <p:sp>
         <p:nvSpPr>
-          <p:cNvPr id="2" name="Titel 1">
-            <a:extLst>
-              <a:ext uri="{FF2B5EF4-FFF2-40B4-BE49-F238E27FC236}">
-                <a16:creationId xmlns:a16="http://schemas.microsoft.com/office/drawing/2014/main" id="{0D5CDDA6-6B6C-4421-A512-2C9ADC34A9D9}"/>
-              </a:ext>
-            </a:extLst>
-          </p:cNvPr>
-          <p:cNvSpPr>
-            <a:spLocks noGrp="1"/>
-          </p:cNvSpPr>
-          <p:nvPr>
-            <p:ph type="title"/>
-          </p:nvPr>
-        </p:nvSpPr>
-        <p:spPr/>
-        <p:txBody>
-          <a:bodyPr/>
-          <a:lstStyle/>
-          <a:p>
-            <a:r>
-              <a:rPr lang="de-DE" dirty="0"/>
-              <a:t>Approach</a:t>
-            </a:r>
-          </a:p>
-        </p:txBody>
-      </p:sp>
-      <p:sp>
-        <p:nvSpPr>
-          <p:cNvPr id="3" name="Inhaltsplatzhalter 2">
-            <a:extLst>
-              <a:ext uri="{FF2B5EF4-FFF2-40B4-BE49-F238E27FC236}">
-                <a16:creationId xmlns:a16="http://schemas.microsoft.com/office/drawing/2014/main" id="{E3041BC5-FA03-4B87-B554-B1722DBB22E6}"/>
-              </a:ext>
-            </a:extLst>
-          </p:cNvPr>
-          <p:cNvSpPr>
-            <a:spLocks noGrp="1"/>
-          </p:cNvSpPr>
-          <p:nvPr>
-            <p:ph idx="1"/>
-          </p:nvPr>
-        </p:nvSpPr>
-        <p:spPr/>
-        <p:txBody>
-          <a:bodyPr/>
-          <a:lstStyle/>
-          <a:p>
-            <a:r>
-              <a:rPr lang="de-DE" dirty="0"/>
-              <a:t>Test </a:t>
-            </a:r>
-            <a:r>
-              <a:rPr lang="de-DE" dirty="0" err="1"/>
-              <a:t>wheter</a:t>
-            </a:r>
-            <a:r>
-              <a:rPr lang="de-DE" dirty="0"/>
-              <a:t> </a:t>
-            </a:r>
-            <a:r>
-              <a:rPr lang="de-DE" dirty="0" err="1"/>
-              <a:t>it</a:t>
-            </a:r>
-            <a:r>
-              <a:rPr lang="de-DE" dirty="0"/>
-              <a:t> </a:t>
-            </a:r>
-            <a:r>
-              <a:rPr lang="de-DE" dirty="0" err="1"/>
-              <a:t>is</a:t>
-            </a:r>
-            <a:r>
-              <a:rPr lang="de-DE" dirty="0"/>
-              <a:t> </a:t>
-            </a:r>
-            <a:r>
-              <a:rPr lang="de-DE" dirty="0" err="1"/>
-              <a:t>possible</a:t>
-            </a:r>
-            <a:r>
-              <a:rPr lang="de-DE" dirty="0"/>
-              <a:t> </a:t>
-            </a:r>
-            <a:r>
-              <a:rPr lang="de-DE" dirty="0" err="1"/>
-              <a:t>to</a:t>
-            </a:r>
-            <a:r>
-              <a:rPr lang="de-DE" dirty="0"/>
-              <a:t> </a:t>
-            </a:r>
-            <a:r>
-              <a:rPr lang="de-DE" dirty="0" err="1"/>
-              <a:t>predict</a:t>
-            </a:r>
-            <a:r>
-              <a:rPr lang="de-DE" dirty="0"/>
-              <a:t> </a:t>
-            </a:r>
-            <a:r>
-              <a:rPr lang="de-DE" dirty="0" err="1"/>
-              <a:t>performance</a:t>
-            </a:r>
-            <a:r>
-              <a:rPr lang="de-DE" dirty="0"/>
-              <a:t> </a:t>
-            </a:r>
-            <a:r>
-              <a:rPr lang="de-DE" dirty="0" err="1"/>
-              <a:t>of</a:t>
-            </a:r>
-            <a:r>
-              <a:rPr lang="de-DE" dirty="0"/>
-              <a:t> </a:t>
-            </a:r>
-            <a:r>
-              <a:rPr lang="de-DE" dirty="0" err="1"/>
-              <a:t>classifiers</a:t>
-            </a:r>
-            <a:r>
-              <a:rPr lang="de-DE" dirty="0"/>
-              <a:t> </a:t>
-            </a:r>
-            <a:r>
-              <a:rPr lang="de-DE" dirty="0" err="1"/>
-              <a:t>well</a:t>
-            </a:r>
-            <a:r>
-              <a:rPr lang="de-DE" dirty="0"/>
-              <a:t> </a:t>
-            </a:r>
-            <a:r>
-              <a:rPr lang="de-DE" dirty="0" err="1"/>
-              <a:t>enough</a:t>
-            </a:r>
-            <a:r>
-              <a:rPr lang="de-DE" dirty="0"/>
-              <a:t> on </a:t>
-            </a:r>
-            <a:r>
-              <a:rPr lang="de-DE" dirty="0" err="1"/>
-              <a:t>basis</a:t>
-            </a:r>
-            <a:r>
-              <a:rPr lang="de-DE" dirty="0"/>
-              <a:t> </a:t>
-            </a:r>
-            <a:r>
-              <a:rPr lang="de-DE" dirty="0" err="1"/>
-              <a:t>of</a:t>
-            </a:r>
-            <a:r>
-              <a:rPr lang="de-DE" dirty="0"/>
-              <a:t> </a:t>
-            </a:r>
-            <a:r>
-              <a:rPr lang="de-DE" dirty="0" err="1"/>
-              <a:t>metadata</a:t>
-            </a:r>
-            <a:r>
-              <a:rPr lang="de-DE" dirty="0"/>
-              <a:t> (</a:t>
-            </a:r>
-            <a:r>
-              <a:rPr lang="de-DE" dirty="0" err="1"/>
-              <a:t>abstraction</a:t>
-            </a:r>
-            <a:r>
-              <a:rPr lang="de-DE" dirty="0"/>
-              <a:t> </a:t>
-            </a:r>
-            <a:r>
-              <a:rPr lang="de-DE" dirty="0" err="1"/>
-              <a:t>question</a:t>
-            </a:r>
-            <a:r>
-              <a:rPr lang="de-DE" dirty="0"/>
-              <a:t>)</a:t>
-            </a:r>
-          </a:p>
-          <a:p>
-            <a:r>
-              <a:rPr lang="de-DE" dirty="0"/>
-              <a:t>Implementation </a:t>
-            </a:r>
-            <a:r>
-              <a:rPr lang="de-DE" dirty="0" err="1"/>
-              <a:t>is</a:t>
-            </a:r>
-            <a:r>
-              <a:rPr lang="de-DE" dirty="0"/>
-              <a:t> </a:t>
-            </a:r>
-            <a:r>
-              <a:rPr lang="de-DE" dirty="0" err="1"/>
-              <a:t>supposed</a:t>
-            </a:r>
-            <a:r>
-              <a:rPr lang="de-DE" dirty="0"/>
-              <a:t> </a:t>
-            </a:r>
-            <a:r>
-              <a:rPr lang="de-DE" dirty="0" err="1"/>
-              <a:t>to</a:t>
-            </a:r>
-            <a:r>
-              <a:rPr lang="de-DE" dirty="0"/>
-              <a:t> </a:t>
-            </a:r>
-            <a:r>
-              <a:rPr lang="de-DE" dirty="0" err="1"/>
-              <a:t>be</a:t>
-            </a:r>
-            <a:r>
-              <a:rPr lang="de-DE" dirty="0"/>
-              <a:t> </a:t>
-            </a:r>
-            <a:r>
-              <a:rPr lang="de-DE" dirty="0" err="1"/>
-              <a:t>integrated</a:t>
-            </a:r>
-            <a:r>
-              <a:rPr lang="de-DE" dirty="0"/>
-              <a:t> in </a:t>
-            </a:r>
-            <a:r>
-              <a:rPr lang="de-DE" dirty="0" err="1"/>
-              <a:t>solutions</a:t>
-            </a:r>
-            <a:r>
-              <a:rPr lang="de-DE" dirty="0"/>
-              <a:t>: Assist in </a:t>
-            </a:r>
-            <a:r>
-              <a:rPr lang="de-DE" dirty="0" err="1"/>
-              <a:t>pre-selecting</a:t>
-            </a:r>
-            <a:r>
-              <a:rPr lang="de-DE" dirty="0"/>
-              <a:t> </a:t>
-            </a:r>
-            <a:r>
-              <a:rPr lang="de-DE" dirty="0" err="1"/>
-              <a:t>good</a:t>
-            </a:r>
-            <a:r>
-              <a:rPr lang="de-DE" dirty="0"/>
-              <a:t> </a:t>
-            </a:r>
-            <a:r>
-              <a:rPr lang="de-DE" dirty="0" err="1"/>
-              <a:t>algorithms</a:t>
-            </a:r>
-            <a:r>
-              <a:rPr lang="de-DE" dirty="0"/>
-              <a:t> </a:t>
-            </a:r>
-            <a:r>
-              <a:rPr lang="de-DE" dirty="0" err="1"/>
-              <a:t>under</a:t>
-            </a:r>
-            <a:r>
-              <a:rPr lang="de-DE" dirty="0"/>
-              <a:t> </a:t>
-            </a:r>
-            <a:r>
-              <a:rPr lang="de-DE" dirty="0" err="1"/>
-              <a:t>tight</a:t>
-            </a:r>
-            <a:r>
-              <a:rPr lang="de-DE" dirty="0"/>
-              <a:t> time-</a:t>
-            </a:r>
-            <a:r>
-              <a:rPr lang="de-DE" dirty="0" err="1"/>
-              <a:t>constraints</a:t>
-            </a:r>
-            <a:endParaRPr lang="de-DE" dirty="0"/>
-          </a:p>
-          <a:p>
-            <a:r>
-              <a:rPr lang="de-DE" dirty="0"/>
-              <a:t>Dataset </a:t>
-            </a:r>
-            <a:r>
-              <a:rPr lang="de-DE" dirty="0" err="1"/>
-              <a:t>as</a:t>
-            </a:r>
-            <a:r>
-              <a:rPr lang="de-DE" dirty="0"/>
-              <a:t> </a:t>
-            </a:r>
-            <a:r>
-              <a:rPr lang="de-DE" dirty="0" err="1"/>
-              <a:t>input</a:t>
-            </a:r>
-            <a:r>
-              <a:rPr lang="de-DE" dirty="0"/>
-              <a:t>, </a:t>
-            </a:r>
-            <a:r>
-              <a:rPr lang="de-DE" dirty="0" err="1"/>
-              <a:t>ranking</a:t>
-            </a:r>
-            <a:r>
-              <a:rPr lang="de-DE" dirty="0"/>
-              <a:t> </a:t>
-            </a:r>
-            <a:r>
-              <a:rPr lang="de-DE" dirty="0" err="1"/>
-              <a:t>of</a:t>
-            </a:r>
-            <a:r>
-              <a:rPr lang="de-DE" dirty="0"/>
-              <a:t> </a:t>
-            </a:r>
-            <a:r>
-              <a:rPr lang="de-DE" dirty="0" err="1"/>
-              <a:t>classifiers</a:t>
-            </a:r>
-            <a:r>
-              <a:rPr lang="de-DE" dirty="0"/>
-              <a:t> </a:t>
-            </a:r>
-            <a:r>
-              <a:rPr lang="de-DE" dirty="0" err="1"/>
-              <a:t>as</a:t>
-            </a:r>
-            <a:r>
-              <a:rPr lang="de-DE" dirty="0"/>
-              <a:t> </a:t>
-            </a:r>
-            <a:r>
-              <a:rPr lang="de-DE" dirty="0" err="1"/>
-              <a:t>output</a:t>
-            </a:r>
-            <a:endParaRPr lang="de-DE" dirty="0"/>
-          </a:p>
-          <a:p>
-            <a:r>
-              <a:rPr lang="de-DE" dirty="0"/>
-              <a:t>Method List&lt;</a:t>
-            </a:r>
-            <a:r>
-              <a:rPr lang="de-DE" dirty="0" err="1"/>
-              <a:t>Classifier</a:t>
-            </a:r>
-            <a:r>
-              <a:rPr lang="de-DE" dirty="0"/>
-              <a:t>&gt; </a:t>
-            </a:r>
-            <a:r>
-              <a:rPr lang="de-DE" dirty="0" err="1"/>
-              <a:t>getRanking</a:t>
-            </a:r>
-            <a:r>
-              <a:rPr lang="de-DE" dirty="0"/>
-              <a:t>(</a:t>
-            </a:r>
-            <a:r>
-              <a:rPr lang="de-DE" dirty="0" err="1"/>
-              <a:t>Instances</a:t>
-            </a:r>
-            <a:r>
-              <a:rPr lang="de-DE" dirty="0"/>
-              <a:t> y, Labels y) {] (</a:t>
-            </a:r>
-            <a:r>
-              <a:rPr lang="de-DE" dirty="0" err="1"/>
-              <a:t>eig</a:t>
-            </a:r>
-            <a:r>
-              <a:rPr lang="de-DE" dirty="0"/>
-              <a:t> ja nicht -&gt; </a:t>
-            </a:r>
-            <a:r>
-              <a:rPr lang="de-DE" dirty="0" err="1"/>
-              <a:t>letzes</a:t>
-            </a:r>
-            <a:r>
-              <a:rPr lang="de-DE" dirty="0"/>
-              <a:t> Attribut implizit Klasse?)</a:t>
-            </a:r>
-          </a:p>
-          <a:p>
-            <a:r>
-              <a:rPr lang="de-DE" dirty="0" err="1"/>
-              <a:t>Internally</a:t>
-            </a:r>
-            <a:r>
-              <a:rPr lang="de-DE" dirty="0"/>
-              <a:t> </a:t>
-            </a:r>
-            <a:r>
-              <a:rPr lang="de-DE" dirty="0" err="1"/>
-              <a:t>either</a:t>
-            </a:r>
-            <a:r>
-              <a:rPr lang="de-DE" dirty="0"/>
-              <a:t> </a:t>
-            </a:r>
-            <a:r>
-              <a:rPr lang="de-DE" dirty="0" err="1"/>
-              <a:t>regression</a:t>
-            </a:r>
-            <a:r>
-              <a:rPr lang="de-DE" dirty="0"/>
-              <a:t> / </a:t>
-            </a:r>
-            <a:r>
-              <a:rPr lang="de-DE" dirty="0" err="1"/>
-              <a:t>ranking</a:t>
-            </a:r>
-            <a:r>
-              <a:rPr lang="de-DE" dirty="0"/>
-              <a:t> </a:t>
-            </a:r>
-            <a:r>
-              <a:rPr lang="de-DE" dirty="0" err="1"/>
-              <a:t>algorithm</a:t>
-            </a:r>
-            <a:r>
-              <a:rPr lang="de-DE" dirty="0"/>
-              <a:t> </a:t>
-            </a:r>
-            <a:r>
-              <a:rPr lang="de-DE" dirty="0" err="1"/>
-              <a:t>used</a:t>
-            </a:r>
-            <a:r>
-              <a:rPr lang="de-DE" dirty="0"/>
-              <a:t>, </a:t>
-            </a:r>
-            <a:r>
-              <a:rPr lang="de-DE" dirty="0" err="1"/>
-              <a:t>choose</a:t>
-            </a:r>
-            <a:r>
-              <a:rPr lang="de-DE" dirty="0"/>
-              <a:t> </a:t>
-            </a:r>
-            <a:r>
-              <a:rPr lang="de-DE" dirty="0" err="1"/>
-              <a:t>with</a:t>
-            </a:r>
-            <a:r>
-              <a:rPr lang="de-DE" dirty="0"/>
-              <a:t> </a:t>
-            </a:r>
-            <a:r>
-              <a:rPr lang="de-DE" dirty="0" err="1"/>
-              <a:t>flag</a:t>
-            </a:r>
-            <a:endParaRPr lang="de-DE" dirty="0"/>
-          </a:p>
-          <a:p>
-            <a:endParaRPr lang="de-DE" dirty="0"/>
-          </a:p>
-          <a:p>
-            <a:pPr marL="0" indent="0">
-              <a:buNone/>
-            </a:pPr>
-            <a:endParaRPr lang="de-DE" dirty="0"/>
-          </a:p>
-        </p:txBody>
-      </p:sp>
-    </p:spTree>
-    <p:extLst>
-      <p:ext uri="{BB962C8B-B14F-4D97-AF65-F5344CB8AC3E}">
-        <p14:creationId xmlns:p14="http://schemas.microsoft.com/office/powerpoint/2010/main" val="2338843410"/>
-      </p:ext>
-    </p:extLst>
-  </p:cSld>
-  <p:clrMapOvr>
-    <a:masterClrMapping/>
-  </p:clrMapOvr>
-</p:sld>
-</file>
-
-<file path=ppt/slides/slide5.xml><?xml version="1.0" encoding="utf-8"?>
-<p:sld xmlns:a="http://schemas.openxmlformats.org/drawingml/2006/main" xmlns:r="http://schemas.openxmlformats.org/officeDocument/2006/relationships" xmlns:p="http://schemas.openxmlformats.org/presentationml/2006/main">
-  <p:cSld>
-    <p:spTree>
-      <p:nvGrpSpPr>
-        <p:cNvPr id="1" name=""/>
-        <p:cNvGrpSpPr/>
-        <p:nvPr/>
-      </p:nvGrpSpPr>
-      <p:grpSpPr>
-        <a:xfrm>
-          <a:off x="0" y="0"/>
-          <a:ext cx="0" cy="0"/>
-          <a:chOff x="0" y="0"/>
-          <a:chExt cx="0" cy="0"/>
-        </a:xfrm>
-      </p:grpSpPr>
-      <p:sp>
-        <p:nvSpPr>
           <p:cNvPr id="5" name="Titel 4">
             <a:extLst>
               <a:ext uri="{FF2B5EF4-FFF2-40B4-BE49-F238E27FC236}">
@@ -4599,11 +4475,19 @@
             </a:r>
             <a:r>
               <a:rPr lang="de-DE" dirty="0" err="1"/>
-              <a:t>dummy</a:t>
-            </a:r>
-            <a:r>
-              <a:rPr lang="de-DE" dirty="0"/>
-              <a:t>-regression </a:t>
+              <a:t>static</a:t>
+            </a:r>
+            <a:r>
+              <a:rPr lang="de-DE" dirty="0"/>
+              <a:t> </a:t>
+            </a:r>
+            <a:r>
+              <a:rPr lang="de-DE" dirty="0" err="1"/>
+              <a:t>regression</a:t>
+            </a:r>
+            <a:r>
+              <a:rPr lang="de-DE" dirty="0"/>
+              <a:t> </a:t>
             </a:r>
             <a:r>
               <a:rPr lang="de-DE" dirty="0" err="1"/>
@@ -4686,11 +4570,19 @@
             </a:r>
             <a:r>
               <a:rPr lang="de-DE" dirty="0" err="1"/>
-              <a:t>dummy</a:t>
-            </a:r>
-            <a:r>
-              <a:rPr lang="de-DE" dirty="0"/>
-              <a:t>-ranking </a:t>
+              <a:t>static</a:t>
+            </a:r>
+            <a:r>
+              <a:rPr lang="de-DE" dirty="0"/>
+              <a:t> </a:t>
+            </a:r>
+            <a:r>
+              <a:rPr lang="de-DE" dirty="0" err="1"/>
+              <a:t>ranking</a:t>
+            </a:r>
+            <a:r>
+              <a:rPr lang="de-DE" dirty="0"/>
+              <a:t> </a:t>
             </a:r>
             <a:r>
               <a:rPr lang="de-DE" dirty="0" err="1"/>
@@ -5025,6 +4917,237 @@
 </p:sld>
 </file>
 
+<file path=ppt/slides/slide5.xml><?xml version="1.0" encoding="utf-8"?>
+<p:sld xmlns:a="http://schemas.openxmlformats.org/drawingml/2006/main" xmlns:r="http://schemas.openxmlformats.org/officeDocument/2006/relationships" xmlns:p="http://schemas.openxmlformats.org/presentationml/2006/main">
+  <p:cSld>
+    <p:spTree>
+      <p:nvGrpSpPr>
+        <p:cNvPr id="1" name=""/>
+        <p:cNvGrpSpPr/>
+        <p:nvPr/>
+      </p:nvGrpSpPr>
+      <p:grpSpPr>
+        <a:xfrm>
+          <a:off x="0" y="0"/>
+          <a:ext cx="0" cy="0"/>
+          <a:chOff x="0" y="0"/>
+          <a:chExt cx="0" cy="0"/>
+        </a:xfrm>
+      </p:grpSpPr>
+      <p:sp>
+        <p:nvSpPr>
+          <p:cNvPr id="2" name="Titel 1">
+            <a:extLst>
+              <a:ext uri="{FF2B5EF4-FFF2-40B4-BE49-F238E27FC236}">
+                <a16:creationId xmlns:a16="http://schemas.microsoft.com/office/drawing/2014/main" id="{F255679B-CE49-4702-BE5A-F8577BB71907}"/>
+              </a:ext>
+            </a:extLst>
+          </p:cNvPr>
+          <p:cNvSpPr>
+            <a:spLocks noGrp="1"/>
+          </p:cNvSpPr>
+          <p:nvPr>
+            <p:ph type="title"/>
+          </p:nvPr>
+        </p:nvSpPr>
+        <p:spPr/>
+        <p:txBody>
+          <a:bodyPr/>
+          <a:lstStyle/>
+          <a:p>
+            <a:r>
+              <a:rPr lang="de-DE" dirty="0"/>
+              <a:t>Second </a:t>
+            </a:r>
+            <a:r>
+              <a:rPr lang="de-DE" dirty="0" err="1"/>
+              <a:t>phase</a:t>
+            </a:r>
+            <a:endParaRPr lang="de-DE" dirty="0"/>
+          </a:p>
+        </p:txBody>
+      </p:sp>
+      <p:sp>
+        <p:nvSpPr>
+          <p:cNvPr id="3" name="Inhaltsplatzhalter 2">
+            <a:extLst>
+              <a:ext uri="{FF2B5EF4-FFF2-40B4-BE49-F238E27FC236}">
+                <a16:creationId xmlns:a16="http://schemas.microsoft.com/office/drawing/2014/main" id="{78E5D827-339D-4819-8177-9954DA5DDFB4}"/>
+              </a:ext>
+            </a:extLst>
+          </p:cNvPr>
+          <p:cNvSpPr>
+            <a:spLocks noGrp="1"/>
+          </p:cNvSpPr>
+          <p:nvPr>
+            <p:ph idx="1"/>
+          </p:nvPr>
+        </p:nvSpPr>
+        <p:spPr/>
+        <p:txBody>
+          <a:bodyPr/>
+          <a:lstStyle/>
+          <a:p>
+            <a:r>
+              <a:rPr lang="de-DE" dirty="0" err="1"/>
+              <a:t>Replace</a:t>
+            </a:r>
+            <a:r>
+              <a:rPr lang="de-DE" dirty="0"/>
+              <a:t> </a:t>
+            </a:r>
+            <a:r>
+              <a:rPr lang="de-DE" dirty="0" err="1"/>
+              <a:t>static</a:t>
+            </a:r>
+            <a:r>
+              <a:rPr lang="de-DE" dirty="0"/>
+              <a:t> </a:t>
+            </a:r>
+            <a:r>
+              <a:rPr lang="de-DE" dirty="0" err="1"/>
+              <a:t>algorithms</a:t>
+            </a:r>
+            <a:r>
+              <a:rPr lang="de-DE" dirty="0"/>
+              <a:t>:</a:t>
+            </a:r>
+          </a:p>
+          <a:p>
+            <a:pPr lvl="1"/>
+            <a:r>
+              <a:rPr lang="de-DE" dirty="0"/>
+              <a:t>Regression-Pipeline </a:t>
+            </a:r>
+            <a:r>
+              <a:rPr lang="de-DE" dirty="0" err="1"/>
+              <a:t>found</a:t>
+            </a:r>
+            <a:r>
+              <a:rPr lang="de-DE" dirty="0"/>
+              <a:t> via ML-Plan </a:t>
+            </a:r>
+            <a:r>
+              <a:rPr lang="de-DE" dirty="0" err="1"/>
+              <a:t>framework</a:t>
+            </a:r>
+            <a:r>
+              <a:rPr lang="de-DE" dirty="0"/>
+              <a:t> </a:t>
+            </a:r>
+            <a:r>
+              <a:rPr lang="de-DE" dirty="0" err="1"/>
+              <a:t>for</a:t>
+            </a:r>
+            <a:r>
+              <a:rPr lang="de-DE" dirty="0"/>
+              <a:t> </a:t>
+            </a:r>
+            <a:r>
+              <a:rPr lang="de-DE" dirty="0" err="1"/>
+              <a:t>each</a:t>
+            </a:r>
+            <a:r>
+              <a:rPr lang="de-DE" dirty="0"/>
+              <a:t> </a:t>
+            </a:r>
+            <a:r>
+              <a:rPr lang="de-DE" dirty="0" err="1"/>
+              <a:t>algorithm</a:t>
+            </a:r>
+            <a:endParaRPr lang="de-DE" dirty="0"/>
+          </a:p>
+          <a:p>
+            <a:pPr lvl="1"/>
+            <a:r>
+              <a:rPr lang="de-DE" dirty="0"/>
+              <a:t>Ranking-</a:t>
+            </a:r>
+            <a:r>
+              <a:rPr lang="de-DE" dirty="0" err="1"/>
+              <a:t>Algorithm</a:t>
+            </a:r>
+            <a:r>
+              <a:rPr lang="de-DE" dirty="0"/>
+              <a:t>: </a:t>
+            </a:r>
+            <a:r>
+              <a:rPr lang="de-DE" dirty="0" err="1"/>
+              <a:t>need</a:t>
+            </a:r>
+            <a:r>
+              <a:rPr lang="de-DE" dirty="0"/>
+              <a:t> </a:t>
+            </a:r>
+            <a:r>
+              <a:rPr lang="de-DE" dirty="0" err="1"/>
+              <a:t>one</a:t>
+            </a:r>
+            <a:r>
+              <a:rPr lang="de-DE" dirty="0"/>
+              <a:t> </a:t>
+            </a:r>
+            <a:r>
+              <a:rPr lang="de-DE" dirty="0" err="1"/>
+              <a:t>for</a:t>
+            </a:r>
+            <a:r>
+              <a:rPr lang="de-DE" dirty="0"/>
+              <a:t> all </a:t>
+            </a:r>
+            <a:r>
+              <a:rPr lang="de-DE" dirty="0" err="1"/>
+              <a:t>classifiers</a:t>
+            </a:r>
+            <a:r>
+              <a:rPr lang="de-DE" dirty="0"/>
+              <a:t>, do </a:t>
+            </a:r>
+            <a:r>
+              <a:rPr lang="de-DE" dirty="0" err="1"/>
+              <a:t>research</a:t>
+            </a:r>
+            <a:r>
+              <a:rPr lang="de-DE" dirty="0"/>
+              <a:t> and </a:t>
+            </a:r>
+            <a:r>
+              <a:rPr lang="de-DE" dirty="0" err="1"/>
+              <a:t>choose</a:t>
+            </a:r>
+            <a:r>
+              <a:rPr lang="de-DE" dirty="0"/>
+              <a:t> </a:t>
+            </a:r>
+            <a:r>
+              <a:rPr lang="de-DE" dirty="0" err="1"/>
+              <a:t>good</a:t>
+            </a:r>
+            <a:r>
+              <a:rPr lang="de-DE" dirty="0"/>
+              <a:t> </a:t>
+            </a:r>
+            <a:r>
+              <a:rPr lang="de-DE" dirty="0" err="1"/>
+              <a:t>one</a:t>
+            </a:r>
+            <a:endParaRPr lang="de-DE" dirty="0"/>
+          </a:p>
+        </p:txBody>
+      </p:sp>
+    </p:spTree>
+    <p:extLst>
+      <p:ext uri="{BB962C8B-B14F-4D97-AF65-F5344CB8AC3E}">
+        <p14:creationId xmlns:p14="http://schemas.microsoft.com/office/powerpoint/2010/main" val="1697359502"/>
+      </p:ext>
+    </p:extLst>
+  </p:cSld>
+  <p:clrMapOvr>
+    <a:masterClrMapping/>
+  </p:clrMapOvr>
+</p:sld>
+</file>
+
 <file path=ppt/slides/slide6.xml><?xml version="1.0" encoding="utf-8"?>
 <p:sld xmlns:a="http://schemas.openxmlformats.org/drawingml/2006/main" xmlns:r="http://schemas.openxmlformats.org/officeDocument/2006/relationships" xmlns:p="http://schemas.openxmlformats.org/presentationml/2006/main">
   <p:cSld>
@@ -5047,237 +5170,6 @@
           <p:cNvPr id="2" name="Titel 1">
             <a:extLst>
               <a:ext uri="{FF2B5EF4-FFF2-40B4-BE49-F238E27FC236}">
-                <a16:creationId xmlns:a16="http://schemas.microsoft.com/office/drawing/2014/main" id="{F255679B-CE49-4702-BE5A-F8577BB71907}"/>
-              </a:ext>
-            </a:extLst>
-          </p:cNvPr>
-          <p:cNvSpPr>
-            <a:spLocks noGrp="1"/>
-          </p:cNvSpPr>
-          <p:nvPr>
-            <p:ph type="title"/>
-          </p:nvPr>
-        </p:nvSpPr>
-        <p:spPr/>
-        <p:txBody>
-          <a:bodyPr/>
-          <a:lstStyle/>
-          <a:p>
-            <a:r>
-              <a:rPr lang="de-DE" dirty="0"/>
-              <a:t>Second </a:t>
-            </a:r>
-            <a:r>
-              <a:rPr lang="de-DE" dirty="0" err="1"/>
-              <a:t>phase</a:t>
-            </a:r>
-            <a:endParaRPr lang="de-DE" dirty="0"/>
-          </a:p>
-        </p:txBody>
-      </p:sp>
-      <p:sp>
-        <p:nvSpPr>
-          <p:cNvPr id="3" name="Inhaltsplatzhalter 2">
-            <a:extLst>
-              <a:ext uri="{FF2B5EF4-FFF2-40B4-BE49-F238E27FC236}">
-                <a16:creationId xmlns:a16="http://schemas.microsoft.com/office/drawing/2014/main" id="{78E5D827-339D-4819-8177-9954DA5DDFB4}"/>
-              </a:ext>
-            </a:extLst>
-          </p:cNvPr>
-          <p:cNvSpPr>
-            <a:spLocks noGrp="1"/>
-          </p:cNvSpPr>
-          <p:nvPr>
-            <p:ph idx="1"/>
-          </p:nvPr>
-        </p:nvSpPr>
-        <p:spPr/>
-        <p:txBody>
-          <a:bodyPr/>
-          <a:lstStyle/>
-          <a:p>
-            <a:r>
-              <a:rPr lang="de-DE" dirty="0" err="1"/>
-              <a:t>Replace</a:t>
-            </a:r>
-            <a:r>
-              <a:rPr lang="de-DE" dirty="0"/>
-              <a:t> </a:t>
-            </a:r>
-            <a:r>
-              <a:rPr lang="de-DE" dirty="0" err="1"/>
-              <a:t>dummy</a:t>
-            </a:r>
-            <a:r>
-              <a:rPr lang="de-DE" dirty="0"/>
-              <a:t> </a:t>
-            </a:r>
-            <a:r>
-              <a:rPr lang="de-DE" dirty="0" err="1"/>
-              <a:t>algorithms</a:t>
-            </a:r>
-            <a:r>
-              <a:rPr lang="de-DE" dirty="0"/>
-              <a:t>:</a:t>
-            </a:r>
-          </a:p>
-          <a:p>
-            <a:pPr lvl="1"/>
-            <a:r>
-              <a:rPr lang="de-DE" dirty="0"/>
-              <a:t>Regression-Pipeline </a:t>
-            </a:r>
-            <a:r>
-              <a:rPr lang="de-DE" dirty="0" err="1"/>
-              <a:t>found</a:t>
-            </a:r>
-            <a:r>
-              <a:rPr lang="de-DE" dirty="0"/>
-              <a:t> via Auto-ML </a:t>
-            </a:r>
-            <a:r>
-              <a:rPr lang="de-DE" dirty="0" err="1"/>
-              <a:t>framework</a:t>
-            </a:r>
-            <a:r>
-              <a:rPr lang="de-DE" dirty="0"/>
-              <a:t> </a:t>
-            </a:r>
-            <a:r>
-              <a:rPr lang="de-DE" dirty="0" err="1"/>
-              <a:t>for</a:t>
-            </a:r>
-            <a:r>
-              <a:rPr lang="de-DE" dirty="0"/>
-              <a:t> </a:t>
-            </a:r>
-            <a:r>
-              <a:rPr lang="de-DE" dirty="0" err="1"/>
-              <a:t>each</a:t>
-            </a:r>
-            <a:r>
-              <a:rPr lang="de-DE" dirty="0"/>
-              <a:t> </a:t>
-            </a:r>
-            <a:r>
-              <a:rPr lang="de-DE" dirty="0" err="1"/>
-              <a:t>algorithm</a:t>
-            </a:r>
-            <a:endParaRPr lang="de-DE" dirty="0"/>
-          </a:p>
-          <a:p>
-            <a:pPr lvl="1"/>
-            <a:r>
-              <a:rPr lang="de-DE" dirty="0"/>
-              <a:t>Ranking-</a:t>
-            </a:r>
-            <a:r>
-              <a:rPr lang="de-DE" dirty="0" err="1"/>
-              <a:t>Algorithm</a:t>
-            </a:r>
-            <a:r>
-              <a:rPr lang="de-DE" dirty="0"/>
-              <a:t>: </a:t>
-            </a:r>
-            <a:r>
-              <a:rPr lang="de-DE" dirty="0" err="1"/>
-              <a:t>need</a:t>
-            </a:r>
-            <a:r>
-              <a:rPr lang="de-DE" dirty="0"/>
-              <a:t> </a:t>
-            </a:r>
-            <a:r>
-              <a:rPr lang="de-DE" dirty="0" err="1"/>
-              <a:t>one</a:t>
-            </a:r>
-            <a:r>
-              <a:rPr lang="de-DE" dirty="0"/>
-              <a:t> </a:t>
-            </a:r>
-            <a:r>
-              <a:rPr lang="de-DE" dirty="0" err="1"/>
-              <a:t>for</a:t>
-            </a:r>
-            <a:r>
-              <a:rPr lang="de-DE" dirty="0"/>
-              <a:t> all </a:t>
-            </a:r>
-            <a:r>
-              <a:rPr lang="de-DE" dirty="0" err="1"/>
-              <a:t>classifiers</a:t>
-            </a:r>
-            <a:r>
-              <a:rPr lang="de-DE" dirty="0"/>
-              <a:t>, do </a:t>
-            </a:r>
-            <a:r>
-              <a:rPr lang="de-DE" dirty="0" err="1"/>
-              <a:t>research</a:t>
-            </a:r>
-            <a:r>
-              <a:rPr lang="de-DE" dirty="0"/>
-              <a:t> and </a:t>
-            </a:r>
-            <a:r>
-              <a:rPr lang="de-DE" dirty="0" err="1"/>
-              <a:t>choose</a:t>
-            </a:r>
-            <a:r>
-              <a:rPr lang="de-DE" dirty="0"/>
-              <a:t> </a:t>
-            </a:r>
-            <a:r>
-              <a:rPr lang="de-DE" dirty="0" err="1"/>
-              <a:t>good</a:t>
-            </a:r>
-            <a:r>
-              <a:rPr lang="de-DE" dirty="0"/>
-              <a:t> </a:t>
-            </a:r>
-            <a:r>
-              <a:rPr lang="de-DE" dirty="0" err="1"/>
-              <a:t>one</a:t>
-            </a:r>
-            <a:endParaRPr lang="de-DE" dirty="0"/>
-          </a:p>
-        </p:txBody>
-      </p:sp>
-    </p:spTree>
-    <p:extLst>
-      <p:ext uri="{BB962C8B-B14F-4D97-AF65-F5344CB8AC3E}">
-        <p14:creationId xmlns:p14="http://schemas.microsoft.com/office/powerpoint/2010/main" val="1697359502"/>
-      </p:ext>
-    </p:extLst>
-  </p:cSld>
-  <p:clrMapOvr>
-    <a:masterClrMapping/>
-  </p:clrMapOvr>
-</p:sld>
-</file>
-
-<file path=ppt/slides/slide7.xml><?xml version="1.0" encoding="utf-8"?>
-<p:sld xmlns:a="http://schemas.openxmlformats.org/drawingml/2006/main" xmlns:r="http://schemas.openxmlformats.org/officeDocument/2006/relationships" xmlns:p="http://schemas.openxmlformats.org/presentationml/2006/main">
-  <p:cSld>
-    <p:spTree>
-      <p:nvGrpSpPr>
-        <p:cNvPr id="1" name=""/>
-        <p:cNvGrpSpPr/>
-        <p:nvPr/>
-      </p:nvGrpSpPr>
-      <p:grpSpPr>
-        <a:xfrm>
-          <a:off x="0" y="0"/>
-          <a:ext cx="0" cy="0"/>
-          <a:chOff x="0" y="0"/>
-          <a:chExt cx="0" cy="0"/>
-        </a:xfrm>
-      </p:grpSpPr>
-      <p:sp>
-        <p:nvSpPr>
-          <p:cNvPr id="2" name="Titel 1">
-            <a:extLst>
-              <a:ext uri="{FF2B5EF4-FFF2-40B4-BE49-F238E27FC236}">
                 <a16:creationId xmlns:a16="http://schemas.microsoft.com/office/drawing/2014/main" id="{93A3A353-CF58-4BFC-B27A-52B51950B54E}"/>
               </a:ext>
             </a:extLst>
@@ -5418,225 +5310,6 @@
     <p:extLst>
       <p:ext uri="{BB962C8B-B14F-4D97-AF65-F5344CB8AC3E}">
         <p14:creationId xmlns:p14="http://schemas.microsoft.com/office/powerpoint/2010/main" val="2610401189"/>
-      </p:ext>
-    </p:extLst>
-  </p:cSld>
-  <p:clrMapOvr>
-    <a:masterClrMapping/>
-  </p:clrMapOvr>
-</p:sld>
-</file>
-
-<file path=ppt/slides/slide8.xml><?xml version="1.0" encoding="utf-8"?>
-<p:sld xmlns:a="http://schemas.openxmlformats.org/drawingml/2006/main" xmlns:r="http://schemas.openxmlformats.org/officeDocument/2006/relationships" xmlns:p="http://schemas.openxmlformats.org/presentationml/2006/main">
-  <p:cSld>
-    <p:spTree>
-      <p:nvGrpSpPr>
-        <p:cNvPr id="1" name=""/>
-        <p:cNvGrpSpPr/>
-        <p:nvPr/>
-      </p:nvGrpSpPr>
-      <p:grpSpPr>
-        <a:xfrm>
-          <a:off x="0" y="0"/>
-          <a:ext cx="0" cy="0"/>
-          <a:chOff x="0" y="0"/>
-          <a:chExt cx="0" cy="0"/>
-        </a:xfrm>
-      </p:grpSpPr>
-      <p:sp>
-        <p:nvSpPr>
-          <p:cNvPr id="2" name="Titel 1">
-            <a:extLst>
-              <a:ext uri="{FF2B5EF4-FFF2-40B4-BE49-F238E27FC236}">
-                <a16:creationId xmlns:a16="http://schemas.microsoft.com/office/drawing/2014/main" id="{E81413C2-5D80-48E3-AABC-844597DADF13}"/>
-              </a:ext>
-            </a:extLst>
-          </p:cNvPr>
-          <p:cNvSpPr>
-            <a:spLocks noGrp="1"/>
-          </p:cNvSpPr>
-          <p:nvPr>
-            <p:ph type="title"/>
-          </p:nvPr>
-        </p:nvSpPr>
-        <p:spPr/>
-        <p:txBody>
-          <a:bodyPr/>
-          <a:lstStyle/>
-          <a:p>
-            <a:r>
-              <a:rPr lang="de-DE" dirty="0" err="1"/>
-              <a:t>Preliminary</a:t>
-            </a:r>
-            <a:r>
-              <a:rPr lang="de-DE" dirty="0"/>
-              <a:t> </a:t>
-            </a:r>
-            <a:r>
-              <a:rPr lang="de-DE" dirty="0" err="1"/>
-              <a:t>Structure</a:t>
-            </a:r>
-            <a:endParaRPr lang="de-DE" dirty="0"/>
-          </a:p>
-        </p:txBody>
-      </p:sp>
-      <p:sp>
-        <p:nvSpPr>
-          <p:cNvPr id="3" name="Inhaltsplatzhalter 2">
-            <a:extLst>
-              <a:ext uri="{FF2B5EF4-FFF2-40B4-BE49-F238E27FC236}">
-                <a16:creationId xmlns:a16="http://schemas.microsoft.com/office/drawing/2014/main" id="{14B73D52-66F6-4F30-87DD-B3EC305DDB90}"/>
-              </a:ext>
-            </a:extLst>
-          </p:cNvPr>
-          <p:cNvSpPr>
-            <a:spLocks noGrp="1"/>
-          </p:cNvSpPr>
-          <p:nvPr>
-            <p:ph idx="1"/>
-          </p:nvPr>
-        </p:nvSpPr>
-        <p:spPr/>
-        <p:txBody>
-          <a:bodyPr/>
-          <a:lstStyle/>
-          <a:p>
-            <a:pPr marL="0" indent="0">
-              <a:buNone/>
-            </a:pPr>
-            <a:r>
-              <a:rPr lang="de-DE" dirty="0"/>
-              <a:t>*</a:t>
-            </a:r>
-            <a:r>
-              <a:rPr lang="de-DE" dirty="0" err="1"/>
-              <a:t>insert</a:t>
-            </a:r>
-            <a:r>
-              <a:rPr lang="de-DE" dirty="0"/>
-              <a:t> </a:t>
-            </a:r>
-            <a:r>
-              <a:rPr lang="de-DE" dirty="0" err="1"/>
-              <a:t>structure</a:t>
-            </a:r>
-            <a:r>
-              <a:rPr lang="de-DE" dirty="0"/>
-              <a:t>*</a:t>
-            </a:r>
-          </a:p>
-        </p:txBody>
-      </p:sp>
-    </p:spTree>
-    <p:extLst>
-      <p:ext uri="{BB962C8B-B14F-4D97-AF65-F5344CB8AC3E}">
-        <p14:creationId xmlns:p14="http://schemas.microsoft.com/office/powerpoint/2010/main" val="729611191"/>
-      </p:ext>
-    </p:extLst>
-  </p:cSld>
-  <p:clrMapOvr>
-    <a:masterClrMapping/>
-  </p:clrMapOvr>
-</p:sld>
-</file>
-
-<file path=ppt/slides/slide9.xml><?xml version="1.0" encoding="utf-8"?>
-<p:sld xmlns:a="http://schemas.openxmlformats.org/drawingml/2006/main" xmlns:r="http://schemas.openxmlformats.org/officeDocument/2006/relationships" xmlns:p="http://schemas.openxmlformats.org/presentationml/2006/main">
-  <p:cSld>
-    <p:spTree>
-      <p:nvGrpSpPr>
-        <p:cNvPr id="1" name=""/>
-        <p:cNvGrpSpPr/>
-        <p:nvPr/>
-      </p:nvGrpSpPr>
-      <p:grpSpPr>
-        <a:xfrm>
-          <a:off x="0" y="0"/>
-          <a:ext cx="0" cy="0"/>
-          <a:chOff x="0" y="0"/>
-          <a:chExt cx="0" cy="0"/>
-        </a:xfrm>
-      </p:grpSpPr>
-      <p:sp>
-        <p:nvSpPr>
-          <p:cNvPr id="2" name="Titel 1">
-            <a:extLst>
-              <a:ext uri="{FF2B5EF4-FFF2-40B4-BE49-F238E27FC236}">
-                <a16:creationId xmlns:a16="http://schemas.microsoft.com/office/drawing/2014/main" id="{90886051-BBB9-442B-929C-5AB98CC8CCED}"/>
-              </a:ext>
-            </a:extLst>
-          </p:cNvPr>
-          <p:cNvSpPr>
-            <a:spLocks noGrp="1"/>
-          </p:cNvSpPr>
-          <p:nvPr>
-            <p:ph type="title"/>
-          </p:nvPr>
-        </p:nvSpPr>
-        <p:spPr/>
-        <p:txBody>
-          <a:bodyPr/>
-          <a:lstStyle/>
-          <a:p>
-            <a:r>
-              <a:rPr lang="de-DE" dirty="0"/>
-              <a:t>Schedule</a:t>
-            </a:r>
-          </a:p>
-        </p:txBody>
-      </p:sp>
-      <p:sp>
-        <p:nvSpPr>
-          <p:cNvPr id="3" name="Inhaltsplatzhalter 2">
-            <a:extLst>
-              <a:ext uri="{FF2B5EF4-FFF2-40B4-BE49-F238E27FC236}">
-                <a16:creationId xmlns:a16="http://schemas.microsoft.com/office/drawing/2014/main" id="{F46CD9C4-B331-4B43-B43E-79B73D02D661}"/>
-              </a:ext>
-            </a:extLst>
-          </p:cNvPr>
-          <p:cNvSpPr>
-            <a:spLocks noGrp="1"/>
-          </p:cNvSpPr>
-          <p:nvPr>
-            <p:ph idx="1"/>
-          </p:nvPr>
-        </p:nvSpPr>
-        <p:spPr/>
-        <p:txBody>
-          <a:bodyPr/>
-          <a:lstStyle/>
-          <a:p>
-            <a:pPr marL="0" indent="0">
-              <a:buNone/>
-            </a:pPr>
-            <a:r>
-              <a:rPr lang="de-DE" dirty="0"/>
-              <a:t>*</a:t>
-            </a:r>
-            <a:r>
-              <a:rPr lang="de-DE" dirty="0" err="1"/>
-              <a:t>insert</a:t>
-            </a:r>
-            <a:r>
-              <a:rPr lang="de-DE" dirty="0"/>
-              <a:t> </a:t>
-            </a:r>
-            <a:r>
-              <a:rPr lang="de-DE" dirty="0" err="1"/>
-              <a:t>schedule</a:t>
-            </a:r>
-            <a:r>
-              <a:rPr lang="de-DE" dirty="0"/>
-              <a:t>*</a:t>
-            </a:r>
-          </a:p>
-        </p:txBody>
-      </p:sp>
-    </p:spTree>
-    <p:extLst>
-      <p:ext uri="{BB962C8B-B14F-4D97-AF65-F5344CB8AC3E}">
-        <p14:creationId xmlns:p14="http://schemas.microsoft.com/office/powerpoint/2010/main" val="1041849213"/>
       </p:ext>
     </p:extLst>
   </p:cSld>

</xml_diff>